<commit_message>
Added changes from lesson
</commit_message>
<xml_diff>
--- a/8.EntityFramework/EntityFramework.pptx
+++ b/8.EntityFramework/EntityFramework.pptx
@@ -2280,54 +2280,6 @@
               </a:spcAft>
               <a:buNone/>
             </a:pPr>
-            <a:r>
-              <a:rPr lang="ru-RU" sz="1200" b="0" i="0" u="none" strike="noStrike" cap="none" dirty="0">
-                <a:solidFill>
-                  <a:schemeClr val="dk1"/>
-                </a:solidFill>
-                <a:latin typeface="Calibri"/>
-                <a:ea typeface="Calibri"/>
-                <a:cs typeface="Calibri"/>
-                <a:sym typeface="Calibri"/>
-              </a:rPr>
-              <a:t>Переходим в код и подключаем </a:t>
-            </a:r>
-            <a:r>
-              <a:rPr lang="en-US" sz="1200" b="0" i="0" u="none" strike="noStrike" cap="none" dirty="0" err="1">
-                <a:solidFill>
-                  <a:schemeClr val="dk1"/>
-                </a:solidFill>
-                <a:latin typeface="Calibri"/>
-                <a:ea typeface="Calibri"/>
-                <a:cs typeface="Calibri"/>
-                <a:sym typeface="Calibri"/>
-              </a:rPr>
-              <a:t>Nuget</a:t>
-            </a:r>
-            <a:r>
-              <a:rPr lang="ru-RU" sz="1200" b="0" i="0" u="none" strike="noStrike" cap="none" dirty="0">
-                <a:solidFill>
-                  <a:schemeClr val="dk1"/>
-                </a:solidFill>
-                <a:latin typeface="Calibri"/>
-                <a:ea typeface="Calibri"/>
-                <a:cs typeface="Calibri"/>
-                <a:sym typeface="Calibri"/>
-              </a:rPr>
-              <a:t> пакет </a:t>
-            </a:r>
-            <a:r>
-              <a:rPr lang="en-US" sz="1200" b="0" i="0" u="none" strike="noStrike" cap="none" dirty="0" err="1">
-                <a:solidFill>
-                  <a:schemeClr val="dk1"/>
-                </a:solidFill>
-                <a:latin typeface="Calibri"/>
-                <a:ea typeface="Calibri"/>
-                <a:cs typeface="Calibri"/>
-                <a:sym typeface="Calibri"/>
-              </a:rPr>
-              <a:t>EntityFramework</a:t>
-            </a:r>
             <a:endParaRPr sz="1200" b="0" i="0" u="none" strike="noStrike" cap="none" dirty="0">
               <a:solidFill>
                 <a:schemeClr val="dk1"/>

</xml_diff>